<commit_message>
Updated Weekly Status Report 1 to best reflect the status of our repository
</commit_message>
<xml_diff>
--- a/doc/Weekly Status Report 1.pptx
+++ b/doc/Weekly Status Report 1.pptx
@@ -6267,10 +6267,10 @@
       </p:pic>
       <p:pic>
         <p:nvPicPr>
-          <p:cNvPr id="3074" name="Picture 2" descr="https://i.imgur.com/dKb5xuk.png">
+          <p:cNvPr id="3078" name="Picture 6" descr="https://i.imgur.com/R0PcnJg.png">
             <a:extLst>
               <a:ext uri="{FF2B5EF4-FFF2-40B4-BE49-F238E27FC236}">
-                <a16:creationId xmlns:a16="http://schemas.microsoft.com/office/drawing/2014/main" id="{972834DC-9D1E-4CA1-A6D2-95B185EC427A}"/>
+                <a16:creationId xmlns:a16="http://schemas.microsoft.com/office/drawing/2014/main" id="{43A60E6F-1B4B-4BB6-9803-40D1FD3A7281}"/>
               </a:ext>
             </a:extLst>
           </p:cNvPr>
@@ -6296,8 +6296,55 @@
         </p:blipFill>
         <p:spPr bwMode="auto">
           <a:xfrm>
-            <a:off x="3803938" y="2207524"/>
-            <a:ext cx="4580947" cy="4111107"/>
+            <a:off x="738741" y="1944085"/>
+            <a:ext cx="5128296" cy="4562771"/>
+          </a:xfrm>
+          <a:prstGeom prst="rect">
+            <a:avLst/>
+          </a:prstGeom>
+          <a:noFill/>
+          <a:extLst>
+            <a:ext uri="{909E8E84-426E-40DD-AFC4-6F175D3DCCD1}">
+              <a14:hiddenFill xmlns:a14="http://schemas.microsoft.com/office/drawing/2010/main">
+                <a:solidFill>
+                  <a:srgbClr val="FFFFFF"/>
+                </a:solidFill>
+              </a14:hiddenFill>
+            </a:ext>
+          </a:extLst>
+        </p:spPr>
+      </p:pic>
+      <p:pic>
+        <p:nvPicPr>
+          <p:cNvPr id="3080" name="Picture 8" descr="https://i.imgur.com/7y5iQCZ.png">
+            <a:extLst>
+              <a:ext uri="{FF2B5EF4-FFF2-40B4-BE49-F238E27FC236}">
+                <a16:creationId xmlns:a16="http://schemas.microsoft.com/office/drawing/2014/main" id="{64AF987D-CCFE-4442-9ABC-3A80D00924E3}"/>
+              </a:ext>
+            </a:extLst>
+          </p:cNvPr>
+          <p:cNvPicPr>
+            <a:picLocks noChangeAspect="1" noChangeArrowheads="1"/>
+          </p:cNvPicPr>
+          <p:nvPr/>
+        </p:nvPicPr>
+        <p:blipFill>
+          <a:blip r:embed="rId4">
+            <a:extLst>
+              <a:ext uri="{28A0092B-C50C-407E-A947-70E740481C1C}">
+                <a14:useLocalDpi xmlns:a14="http://schemas.microsoft.com/office/drawing/2010/main" val="0"/>
+              </a:ext>
+            </a:extLst>
+          </a:blip>
+          <a:srcRect/>
+          <a:stretch>
+            <a:fillRect/>
+          </a:stretch>
+        </p:blipFill>
+        <p:spPr bwMode="auto">
+          <a:xfrm>
+            <a:off x="6324963" y="2824395"/>
+            <a:ext cx="5128296" cy="2529425"/>
           </a:xfrm>
           <a:prstGeom prst="rect">
             <a:avLst/>

</xml_diff>